<commit_message>
got some free food today
</commit_message>
<xml_diff>
--- a/figure/_src/random access delay.pptx
+++ b/figure/_src/random access delay.pptx
@@ -243,7 +243,7 @@
           <a:p>
             <a:fld id="{CF0D0849-A26C-49C4-AF8B-EC180B419FD8}" type="datetimeFigureOut">
               <a:rPr lang="zh-TW" altLang="en-US" smtClean="0"/>
-              <a:t>2025/7/13</a:t>
+              <a:t>2025/7/14</a:t>
             </a:fld>
             <a:endParaRPr lang="zh-TW" altLang="en-US"/>
           </a:p>
@@ -413,7 +413,7 @@
           <a:p>
             <a:fld id="{CF0D0849-A26C-49C4-AF8B-EC180B419FD8}" type="datetimeFigureOut">
               <a:rPr lang="zh-TW" altLang="en-US" smtClean="0"/>
-              <a:t>2025/7/13</a:t>
+              <a:t>2025/7/14</a:t>
             </a:fld>
             <a:endParaRPr lang="zh-TW" altLang="en-US"/>
           </a:p>
@@ -593,7 +593,7 @@
           <a:p>
             <a:fld id="{CF0D0849-A26C-49C4-AF8B-EC180B419FD8}" type="datetimeFigureOut">
               <a:rPr lang="zh-TW" altLang="en-US" smtClean="0"/>
-              <a:t>2025/7/13</a:t>
+              <a:t>2025/7/14</a:t>
             </a:fld>
             <a:endParaRPr lang="zh-TW" altLang="en-US"/>
           </a:p>
@@ -763,7 +763,7 @@
           <a:p>
             <a:fld id="{CF0D0849-A26C-49C4-AF8B-EC180B419FD8}" type="datetimeFigureOut">
               <a:rPr lang="zh-TW" altLang="en-US" smtClean="0"/>
-              <a:t>2025/7/13</a:t>
+              <a:t>2025/7/14</a:t>
             </a:fld>
             <a:endParaRPr lang="zh-TW" altLang="en-US"/>
           </a:p>
@@ -1009,7 +1009,7 @@
           <a:p>
             <a:fld id="{CF0D0849-A26C-49C4-AF8B-EC180B419FD8}" type="datetimeFigureOut">
               <a:rPr lang="zh-TW" altLang="en-US" smtClean="0"/>
-              <a:t>2025/7/13</a:t>
+              <a:t>2025/7/14</a:t>
             </a:fld>
             <a:endParaRPr lang="zh-TW" altLang="en-US"/>
           </a:p>
@@ -1241,7 +1241,7 @@
           <a:p>
             <a:fld id="{CF0D0849-A26C-49C4-AF8B-EC180B419FD8}" type="datetimeFigureOut">
               <a:rPr lang="zh-TW" altLang="en-US" smtClean="0"/>
-              <a:t>2025/7/13</a:t>
+              <a:t>2025/7/14</a:t>
             </a:fld>
             <a:endParaRPr lang="zh-TW" altLang="en-US"/>
           </a:p>
@@ -1608,7 +1608,7 @@
           <a:p>
             <a:fld id="{CF0D0849-A26C-49C4-AF8B-EC180B419FD8}" type="datetimeFigureOut">
               <a:rPr lang="zh-TW" altLang="en-US" smtClean="0"/>
-              <a:t>2025/7/13</a:t>
+              <a:t>2025/7/14</a:t>
             </a:fld>
             <a:endParaRPr lang="zh-TW" altLang="en-US"/>
           </a:p>
@@ -1726,7 +1726,7 @@
           <a:p>
             <a:fld id="{CF0D0849-A26C-49C4-AF8B-EC180B419FD8}" type="datetimeFigureOut">
               <a:rPr lang="zh-TW" altLang="en-US" smtClean="0"/>
-              <a:t>2025/7/13</a:t>
+              <a:t>2025/7/14</a:t>
             </a:fld>
             <a:endParaRPr lang="zh-TW" altLang="en-US"/>
           </a:p>
@@ -1821,7 +1821,7 @@
           <a:p>
             <a:fld id="{CF0D0849-A26C-49C4-AF8B-EC180B419FD8}" type="datetimeFigureOut">
               <a:rPr lang="zh-TW" altLang="en-US" smtClean="0"/>
-              <a:t>2025/7/13</a:t>
+              <a:t>2025/7/14</a:t>
             </a:fld>
             <a:endParaRPr lang="zh-TW" altLang="en-US"/>
           </a:p>
@@ -2098,7 +2098,7 @@
           <a:p>
             <a:fld id="{CF0D0849-A26C-49C4-AF8B-EC180B419FD8}" type="datetimeFigureOut">
               <a:rPr lang="zh-TW" altLang="en-US" smtClean="0"/>
-              <a:t>2025/7/13</a:t>
+              <a:t>2025/7/14</a:t>
             </a:fld>
             <a:endParaRPr lang="zh-TW" altLang="en-US"/>
           </a:p>
@@ -2355,7 +2355,7 @@
           <a:p>
             <a:fld id="{CF0D0849-A26C-49C4-AF8B-EC180B419FD8}" type="datetimeFigureOut">
               <a:rPr lang="zh-TW" altLang="en-US" smtClean="0"/>
-              <a:t>2025/7/13</a:t>
+              <a:t>2025/7/14</a:t>
             </a:fld>
             <a:endParaRPr lang="zh-TW" altLang="en-US"/>
           </a:p>
@@ -2568,7 +2568,7 @@
           <a:p>
             <a:fld id="{CF0D0849-A26C-49C4-AF8B-EC180B419FD8}" type="datetimeFigureOut">
               <a:rPr lang="zh-TW" altLang="en-US" smtClean="0"/>
-              <a:t>2025/7/13</a:t>
+              <a:t>2025/7/14</a:t>
             </a:fld>
             <a:endParaRPr lang="zh-TW" altLang="en-US"/>
           </a:p>
@@ -3324,8 +3324,8 @@
           </a:fontRef>
         </p:style>
       </p:cxnSp>
-      <mc:AlternateContent xmlns:mc="http://schemas.openxmlformats.org/markup-compatibility/2006">
-        <mc:Choice xmlns:a14="http://schemas.microsoft.com/office/drawing/2010/main" Requires="a14">
+      <mc:AlternateContent xmlns:mc="http://schemas.openxmlformats.org/markup-compatibility/2006" xmlns:a14="http://schemas.microsoft.com/office/drawing/2010/main">
+        <mc:Choice Requires="a14">
           <p:sp>
             <p:nvSpPr>
               <p:cNvPr id="22" name="文字方塊 21">
@@ -3433,7 +3433,7 @@
             </p:txBody>
           </p:sp>
         </mc:Choice>
-        <mc:Fallback>
+        <mc:Fallback xmlns="">
           <p:sp>
             <p:nvSpPr>
               <p:cNvPr id="22" name="文字方塊 21">
@@ -3712,8 +3712,8 @@
           </a:p>
         </p:txBody>
       </p:sp>
-      <mc:AlternateContent xmlns:mc="http://schemas.openxmlformats.org/markup-compatibility/2006">
-        <mc:Choice xmlns:a14="http://schemas.microsoft.com/office/drawing/2010/main" Requires="a14">
+      <mc:AlternateContent xmlns:mc="http://schemas.openxmlformats.org/markup-compatibility/2006" xmlns:a14="http://schemas.microsoft.com/office/drawing/2010/main">
+        <mc:Choice Requires="a14">
           <p:sp>
             <p:nvSpPr>
               <p:cNvPr id="39" name="文字方塊 38">
@@ -3821,7 +3821,7 @@
             </p:txBody>
           </p:sp>
         </mc:Choice>
-        <mc:Fallback>
+        <mc:Fallback xmlns="">
           <p:sp>
             <p:nvSpPr>
               <p:cNvPr id="39" name="文字方塊 38">
@@ -3866,8 +3866,8 @@
           </p:sp>
         </mc:Fallback>
       </mc:AlternateContent>
-      <mc:AlternateContent xmlns:mc="http://schemas.openxmlformats.org/markup-compatibility/2006">
-        <mc:Choice xmlns:a14="http://schemas.microsoft.com/office/drawing/2010/main" Requires="a14">
+      <mc:AlternateContent xmlns:mc="http://schemas.openxmlformats.org/markup-compatibility/2006" xmlns:a14="http://schemas.microsoft.com/office/drawing/2010/main">
+        <mc:Choice Requires="a14">
           <p:sp>
             <p:nvSpPr>
               <p:cNvPr id="40" name="文字方塊 39">
@@ -3975,7 +3975,7 @@
             </p:txBody>
           </p:sp>
         </mc:Choice>
-        <mc:Fallback>
+        <mc:Fallback xmlns="">
           <p:sp>
             <p:nvSpPr>
               <p:cNvPr id="40" name="文字方塊 39">
@@ -4149,8 +4149,8 @@
           </a:fontRef>
         </p:style>
       </p:cxnSp>
-      <mc:AlternateContent xmlns:mc="http://schemas.openxmlformats.org/markup-compatibility/2006">
-        <mc:Choice xmlns:a14="http://schemas.microsoft.com/office/drawing/2010/main" Requires="a14">
+      <mc:AlternateContent xmlns:mc="http://schemas.openxmlformats.org/markup-compatibility/2006" xmlns:a14="http://schemas.microsoft.com/office/drawing/2010/main">
+        <mc:Choice Requires="a14">
           <p:sp>
             <p:nvSpPr>
               <p:cNvPr id="44" name="文字方塊 43">
@@ -4258,7 +4258,7 @@
             </p:txBody>
           </p:sp>
         </mc:Choice>
-        <mc:Fallback>
+        <mc:Fallback xmlns="">
           <p:sp>
             <p:nvSpPr>
               <p:cNvPr id="44" name="文字方塊 43">
@@ -4480,8 +4480,8 @@
           </a:fontRef>
         </p:style>
       </p:cxnSp>
-      <mc:AlternateContent xmlns:mc="http://schemas.openxmlformats.org/markup-compatibility/2006">
-        <mc:Choice xmlns:a14="http://schemas.microsoft.com/office/drawing/2010/main" Requires="a14">
+      <mc:AlternateContent xmlns:mc="http://schemas.openxmlformats.org/markup-compatibility/2006" xmlns:a14="http://schemas.microsoft.com/office/drawing/2010/main">
+        <mc:Choice Requires="a14">
           <p:sp>
             <p:nvSpPr>
               <p:cNvPr id="53" name="文字方塊 52">
@@ -4574,7 +4574,7 @@
             </p:txBody>
           </p:sp>
         </mc:Choice>
-        <mc:Fallback>
+        <mc:Fallback xmlns="">
           <p:sp>
             <p:nvSpPr>
               <p:cNvPr id="53" name="文字方塊 52">
@@ -4753,8 +4753,8 @@
           </a:fontRef>
         </p:style>
       </p:cxnSp>
-      <mc:AlternateContent xmlns:mc="http://schemas.openxmlformats.org/markup-compatibility/2006">
-        <mc:Choice xmlns:a14="http://schemas.microsoft.com/office/drawing/2010/main" Requires="a14">
+      <mc:AlternateContent xmlns:mc="http://schemas.openxmlformats.org/markup-compatibility/2006" xmlns:a14="http://schemas.microsoft.com/office/drawing/2010/main">
+        <mc:Choice Requires="a14">
           <p:sp>
             <p:nvSpPr>
               <p:cNvPr id="68" name="文字方塊 67">
@@ -4847,7 +4847,7 @@
             </p:txBody>
           </p:sp>
         </mc:Choice>
-        <mc:Fallback>
+        <mc:Fallback xmlns="">
           <p:sp>
             <p:nvSpPr>
               <p:cNvPr id="68" name="文字方塊 67">
@@ -4892,8 +4892,8 @@
           </p:sp>
         </mc:Fallback>
       </mc:AlternateContent>
-      <mc:AlternateContent xmlns:mc="http://schemas.openxmlformats.org/markup-compatibility/2006">
-        <mc:Choice xmlns:a14="http://schemas.microsoft.com/office/drawing/2010/main" Requires="a14">
+      <mc:AlternateContent xmlns:mc="http://schemas.openxmlformats.org/markup-compatibility/2006" xmlns:a14="http://schemas.microsoft.com/office/drawing/2010/main">
+        <mc:Choice Requires="a14">
           <p:sp>
             <p:nvSpPr>
               <p:cNvPr id="69" name="文字方塊 68">
@@ -4986,7 +4986,7 @@
             </p:txBody>
           </p:sp>
         </mc:Choice>
-        <mc:Fallback>
+        <mc:Fallback xmlns="">
           <p:sp>
             <p:nvSpPr>
               <p:cNvPr id="69" name="文字方塊 68">

</xml_diff>